<commit_message>
Refactor code structure and remove redundant sections for improved readability and maintainability
</commit_message>
<xml_diff>
--- a/Paper_Figure_works.pptx
+++ b/Paper_Figure_works.pptx
@@ -258,7 +258,7 @@
           <a:p>
             <a:fld id="{EE3F4BB4-94DB-47ED-B617-B93459CE2F0F}" type="datetimeFigureOut">
               <a:rPr lang="ko-KR" altLang="en-US" smtClean="0"/>
-              <a:t>2025-04-03</a:t>
+              <a:t>2025-04-10</a:t>
             </a:fld>
             <a:endParaRPr lang="ko-KR" altLang="en-US"/>
           </a:p>
@@ -428,7 +428,7 @@
           <a:p>
             <a:fld id="{EE3F4BB4-94DB-47ED-B617-B93459CE2F0F}" type="datetimeFigureOut">
               <a:rPr lang="ko-KR" altLang="en-US" smtClean="0"/>
-              <a:t>2025-04-03</a:t>
+              <a:t>2025-04-10</a:t>
             </a:fld>
             <a:endParaRPr lang="ko-KR" altLang="en-US"/>
           </a:p>
@@ -608,7 +608,7 @@
           <a:p>
             <a:fld id="{EE3F4BB4-94DB-47ED-B617-B93459CE2F0F}" type="datetimeFigureOut">
               <a:rPr lang="ko-KR" altLang="en-US" smtClean="0"/>
-              <a:t>2025-04-03</a:t>
+              <a:t>2025-04-10</a:t>
             </a:fld>
             <a:endParaRPr lang="ko-KR" altLang="en-US"/>
           </a:p>
@@ -778,7 +778,7 @@
           <a:p>
             <a:fld id="{EE3F4BB4-94DB-47ED-B617-B93459CE2F0F}" type="datetimeFigureOut">
               <a:rPr lang="ko-KR" altLang="en-US" smtClean="0"/>
-              <a:t>2025-04-03</a:t>
+              <a:t>2025-04-10</a:t>
             </a:fld>
             <a:endParaRPr lang="ko-KR" altLang="en-US"/>
           </a:p>
@@ -1024,7 +1024,7 @@
           <a:p>
             <a:fld id="{EE3F4BB4-94DB-47ED-B617-B93459CE2F0F}" type="datetimeFigureOut">
               <a:rPr lang="ko-KR" altLang="en-US" smtClean="0"/>
-              <a:t>2025-04-03</a:t>
+              <a:t>2025-04-10</a:t>
             </a:fld>
             <a:endParaRPr lang="ko-KR" altLang="en-US"/>
           </a:p>
@@ -1256,7 +1256,7 @@
           <a:p>
             <a:fld id="{EE3F4BB4-94DB-47ED-B617-B93459CE2F0F}" type="datetimeFigureOut">
               <a:rPr lang="ko-KR" altLang="en-US" smtClean="0"/>
-              <a:t>2025-04-03</a:t>
+              <a:t>2025-04-10</a:t>
             </a:fld>
             <a:endParaRPr lang="ko-KR" altLang="en-US"/>
           </a:p>
@@ -1623,7 +1623,7 @@
           <a:p>
             <a:fld id="{EE3F4BB4-94DB-47ED-B617-B93459CE2F0F}" type="datetimeFigureOut">
               <a:rPr lang="ko-KR" altLang="en-US" smtClean="0"/>
-              <a:t>2025-04-03</a:t>
+              <a:t>2025-04-10</a:t>
             </a:fld>
             <a:endParaRPr lang="ko-KR" altLang="en-US"/>
           </a:p>
@@ -1741,7 +1741,7 @@
           <a:p>
             <a:fld id="{EE3F4BB4-94DB-47ED-B617-B93459CE2F0F}" type="datetimeFigureOut">
               <a:rPr lang="ko-KR" altLang="en-US" smtClean="0"/>
-              <a:t>2025-04-03</a:t>
+              <a:t>2025-04-10</a:t>
             </a:fld>
             <a:endParaRPr lang="ko-KR" altLang="en-US"/>
           </a:p>
@@ -1836,7 +1836,7 @@
           <a:p>
             <a:fld id="{EE3F4BB4-94DB-47ED-B617-B93459CE2F0F}" type="datetimeFigureOut">
               <a:rPr lang="ko-KR" altLang="en-US" smtClean="0"/>
-              <a:t>2025-04-03</a:t>
+              <a:t>2025-04-10</a:t>
             </a:fld>
             <a:endParaRPr lang="ko-KR" altLang="en-US"/>
           </a:p>
@@ -2113,7 +2113,7 @@
           <a:p>
             <a:fld id="{EE3F4BB4-94DB-47ED-B617-B93459CE2F0F}" type="datetimeFigureOut">
               <a:rPr lang="ko-KR" altLang="en-US" smtClean="0"/>
-              <a:t>2025-04-03</a:t>
+              <a:t>2025-04-10</a:t>
             </a:fld>
             <a:endParaRPr lang="ko-KR" altLang="en-US"/>
           </a:p>
@@ -2366,7 +2366,7 @@
           <a:p>
             <a:fld id="{EE3F4BB4-94DB-47ED-B617-B93459CE2F0F}" type="datetimeFigureOut">
               <a:rPr lang="ko-KR" altLang="en-US" smtClean="0"/>
-              <a:t>2025-04-03</a:t>
+              <a:t>2025-04-10</a:t>
             </a:fld>
             <a:endParaRPr lang="ko-KR" altLang="en-US"/>
           </a:p>
@@ -2579,7 +2579,7 @@
           <a:p>
             <a:fld id="{EE3F4BB4-94DB-47ED-B617-B93459CE2F0F}" type="datetimeFigureOut">
               <a:rPr lang="ko-KR" altLang="en-US" smtClean="0"/>
-              <a:t>2025-04-03</a:t>
+              <a:t>2025-04-10</a:t>
             </a:fld>
             <a:endParaRPr lang="ko-KR" altLang="en-US"/>
           </a:p>
@@ -2986,7 +2986,7 @@
       </p:grpSpPr>
       <p:pic>
         <p:nvPicPr>
-          <p:cNvPr id="4" name="그림 3"/>
+          <p:cNvPr id="2" name="그림 1"/>
           <p:cNvPicPr>
             <a:picLocks noChangeAspect="1"/>
           </p:cNvPicPr>
@@ -3000,8 +3000,8 @@
         </p:blipFill>
         <p:spPr>
           <a:xfrm>
-            <a:off x="168403" y="1286128"/>
-            <a:ext cx="12023597" cy="4285744"/>
+            <a:off x="-138113" y="1267478"/>
+            <a:ext cx="12468225" cy="4323044"/>
           </a:xfrm>
           <a:prstGeom prst="rect">
             <a:avLst/>
@@ -3094,7 +3094,7 @@
       </p:grpSpPr>
       <p:pic>
         <p:nvPicPr>
-          <p:cNvPr id="6" name="그림 5"/>
+          <p:cNvPr id="2" name="그림 1"/>
           <p:cNvPicPr>
             <a:picLocks noChangeAspect="1"/>
           </p:cNvPicPr>
@@ -3108,8 +3108,8 @@
         </p:blipFill>
         <p:spPr>
           <a:xfrm>
-            <a:off x="-1386350" y="1965438"/>
-            <a:ext cx="13826613" cy="2927123"/>
+            <a:off x="-2402143" y="1939720"/>
+            <a:ext cx="16026581" cy="3392861"/>
           </a:xfrm>
           <a:prstGeom prst="rect">
             <a:avLst/>
@@ -3200,6 +3200,29 @@
           <a:chExt cx="0" cy="0"/>
         </a:xfrm>
       </p:grpSpPr>
+      <p:pic>
+        <p:nvPicPr>
+          <p:cNvPr id="5" name="그림 4"/>
+          <p:cNvPicPr>
+            <a:picLocks noChangeAspect="1"/>
+          </p:cNvPicPr>
+          <p:nvPr/>
+        </p:nvPicPr>
+        <p:blipFill rotWithShape="1">
+          <a:blip r:embed="rId2"/>
+          <a:srcRect l="5146"/>
+          <a:stretch/>
+        </p:blipFill>
+        <p:spPr>
+          <a:xfrm>
+            <a:off x="194773" y="1175394"/>
+            <a:ext cx="11561800" cy="3520437"/>
+          </a:xfrm>
+          <a:prstGeom prst="rect">
+            <a:avLst/>
+          </a:prstGeom>
+        </p:spPr>
+      </p:pic>
     </p:spTree>
     <p:extLst>
       <p:ext uri="{BB962C8B-B14F-4D97-AF65-F5344CB8AC3E}">

</xml_diff>